<commit_message>
Added Candy Daniel Icon. Third iteration of Documentation
</commit_message>
<xml_diff>
--- a/Presentation.pptx
+++ b/Presentation.pptx
@@ -812,6 +812,7 @@
           <a:p>
             <a:fld id="{3B1894FC-E103-41F5-BEC1-9C3532091CA7}" type="datetime1">
               <a:rPr lang="en-US" smtClean="0"/>
+              <a:pPr/>
               <a:t>1/29/2016</a:t>
             </a:fld>
             <a:endParaRPr lang="en-CA"/>
@@ -978,6 +979,7 @@
           <a:p>
             <a:fld id="{31429BB7-F491-4DAE-9AE8-4F585E466CED}" type="datetime1">
               <a:rPr lang="en-US" smtClean="0"/>
+              <a:pPr/>
               <a:t>1/29/2016</a:t>
             </a:fld>
             <a:endParaRPr lang="en-CA"/>
@@ -1154,6 +1156,7 @@
           <a:p>
             <a:fld id="{B29D62D9-8645-4901-AE86-1D5BE55BF8A5}" type="datetime1">
               <a:rPr lang="en-US" smtClean="0"/>
+              <a:pPr/>
               <a:t>1/29/2016</a:t>
             </a:fld>
             <a:endParaRPr lang="en-CA"/>
@@ -1320,6 +1323,7 @@
           <a:p>
             <a:fld id="{F80D4BE0-6D42-4AF8-8FC2-85A10C674A42}" type="datetime1">
               <a:rPr lang="en-US" smtClean="0"/>
+              <a:pPr/>
               <a:t>1/29/2016</a:t>
             </a:fld>
             <a:endParaRPr lang="en-CA"/>
@@ -1562,6 +1566,7 @@
           <a:p>
             <a:fld id="{717764C9-B656-4AB4-915E-031F82D736F1}" type="datetime1">
               <a:rPr lang="en-US" smtClean="0"/>
+              <a:pPr/>
               <a:t>1/29/2016</a:t>
             </a:fld>
             <a:endParaRPr lang="en-CA"/>
@@ -1846,6 +1851,7 @@
           <a:p>
             <a:fld id="{EDE94880-70CF-4368-AF99-197295159A3D}" type="datetime1">
               <a:rPr lang="en-US" smtClean="0"/>
+              <a:pPr/>
               <a:t>1/29/2016</a:t>
             </a:fld>
             <a:endParaRPr lang="en-CA"/>
@@ -2264,6 +2270,7 @@
           <a:p>
             <a:fld id="{E62B09E5-D1D7-4170-8307-C1534CDAF4F9}" type="datetime1">
               <a:rPr lang="en-US" smtClean="0"/>
+              <a:pPr/>
               <a:t>1/29/2016</a:t>
             </a:fld>
             <a:endParaRPr lang="en-CA"/>
@@ -2378,6 +2385,7 @@
           <a:p>
             <a:fld id="{2C1E43BD-402D-48B6-99F1-6B33DC7A8045}" type="datetime1">
               <a:rPr lang="en-US" smtClean="0"/>
+              <a:pPr/>
               <a:t>1/29/2016</a:t>
             </a:fld>
             <a:endParaRPr lang="en-CA"/>
@@ -2469,6 +2477,7 @@
           <a:p>
             <a:fld id="{59603D66-CAE1-4A28-92EA-E3E198D0192C}" type="datetime1">
               <a:rPr lang="en-US" smtClean="0"/>
+              <a:pPr/>
               <a:t>1/29/2016</a:t>
             </a:fld>
             <a:endParaRPr lang="en-CA"/>
@@ -2742,6 +2751,7 @@
           <a:p>
             <a:fld id="{08DC18AA-4619-45D8-A70F-CB57C4D13107}" type="datetime1">
               <a:rPr lang="en-US" smtClean="0"/>
+              <a:pPr/>
               <a:t>1/29/2016</a:t>
             </a:fld>
             <a:endParaRPr lang="en-CA"/>
@@ -2991,6 +3001,7 @@
           <a:p>
             <a:fld id="{64BB3973-35BD-4EAB-BFB8-51566BA65160}" type="datetime1">
               <a:rPr lang="en-US" smtClean="0"/>
+              <a:pPr/>
               <a:t>1/29/2016</a:t>
             </a:fld>
             <a:endParaRPr lang="en-CA"/>
@@ -3200,6 +3211,7 @@
           <a:p>
             <a:fld id="{5C686656-FAE6-437C-8C68-DBF8B3DDF5A3}" type="datetime1">
               <a:rPr lang="en-US" smtClean="0"/>
+              <a:pPr/>
               <a:t>1/29/2016</a:t>
             </a:fld>
             <a:endParaRPr lang="en-CA"/>
@@ -3638,7 +3650,17 @@
                   </a:schemeClr>
                 </a:solidFill>
               </a:rPr>
-              <a:t>Daniel Sauvé</a:t>
+              <a:t>Daniel </a:t>
+            </a:r>
+            <a:r>
+              <a:rPr lang="en-CA" dirty="0" smtClean="0">
+                <a:solidFill>
+                  <a:schemeClr val="bg2">
+                    <a:lumMod val="25000"/>
+                  </a:schemeClr>
+                </a:solidFill>
+              </a:rPr>
+              <a:t>Sauvé</a:t>
             </a:r>
             <a:endParaRPr lang="en-CA" dirty="0">
               <a:solidFill>
@@ -3775,19 +3797,7 @@
           <a:p>
             <a:r>
               <a:rPr lang="en-CA" b="1" dirty="0" smtClean="0"/>
-              <a:t>Ontario </a:t>
-            </a:r>
-            <a:r>
-              <a:rPr lang="en-CA" b="1" dirty="0" smtClean="0"/>
-              <a:t>Engineering Competition </a:t>
-            </a:r>
-            <a:r>
-              <a:rPr lang="en-CA" b="1" dirty="0" smtClean="0"/>
-              <a:t>2016</a:t>
-            </a:r>
-            <a:r>
-              <a:rPr lang="en-CA" b="1" dirty="0" smtClean="0"/>
-              <a:t/>
+              <a:t>Ontario Engineering Competition 2016</a:t>
             </a:r>
             <a:br>
               <a:rPr lang="en-CA" b="1" dirty="0" smtClean="0"/>
@@ -3809,7 +3819,7 @@
           <p:nvPr/>
         </p:nvPicPr>
         <p:blipFill>
-          <a:blip r:embed="rId2"/>
+          <a:blip r:embed="rId2" cstate="print"/>
           <a:stretch>
             <a:fillRect/>
           </a:stretch>
@@ -3985,7 +3995,7 @@
           <p:nvPr/>
         </p:nvPicPr>
         <p:blipFill>
-          <a:blip r:embed="rId3"/>
+          <a:blip r:embed="rId3" cstate="print"/>
           <a:stretch>
             <a:fillRect/>
           </a:stretch>
@@ -4086,17 +4096,35 @@
           <a:p>
             <a:r>
               <a:rPr lang="en-CA" dirty="0" smtClean="0"/>
-              <a:t>Create an easy to use, interactive program to teach children to program</a:t>
-            </a:r>
-          </a:p>
-          <a:p>
+              <a:t>Create an easy to use, interactive </a:t>
+            </a:r>
+            <a:r>
+              <a:rPr lang="en-CA" dirty="0" smtClean="0"/>
+              <a:t>application </a:t>
+            </a:r>
+            <a:r>
+              <a:rPr lang="en-CA" dirty="0" smtClean="0"/>
+              <a:t>to teach children </a:t>
+            </a:r>
+            <a:r>
+              <a:rPr lang="en-CA" dirty="0" smtClean="0"/>
+              <a:t>programming</a:t>
+            </a:r>
             <a:endParaRPr lang="en-CA" dirty="0" smtClean="0"/>
           </a:p>
           <a:p>
+            <a:endParaRPr lang="en-CA" dirty="0" smtClean="0"/>
+          </a:p>
+          <a:p>
             <a:r>
               <a:rPr lang="en-CA" dirty="0" smtClean="0"/>
-              <a:t>Must teach users basics of programming</a:t>
-            </a:r>
+              <a:t>Must teach </a:t>
+            </a:r>
+            <a:r>
+              <a:rPr lang="en-CA" dirty="0" smtClean="0"/>
+              <a:t>basic programming concepts</a:t>
+            </a:r>
+            <a:endParaRPr lang="en-CA" dirty="0" smtClean="0"/>
           </a:p>
           <a:p>
             <a:endParaRPr lang="en-CA" dirty="0" smtClean="0"/>
@@ -4106,7 +4134,6 @@
               <a:rPr lang="en-CA" dirty="0" smtClean="0"/>
               <a:t>Kids must be able to create their own code and view the response</a:t>
             </a:r>
-            <a:endParaRPr lang="en-CA" dirty="0" smtClean="0"/>
           </a:p>
           <a:p>
             <a:endParaRPr lang="en-CA" dirty="0"/>
@@ -4225,7 +4252,7 @@
           <p:nvPr/>
         </p:nvPicPr>
         <p:blipFill>
-          <a:blip r:embed="rId3"/>
+          <a:blip r:embed="rId3" cstate="print"/>
           <a:srcRect/>
           <a:stretch>
             <a:fillRect/>
@@ -4299,7 +4326,7 @@
           <p:nvPr/>
         </p:nvPicPr>
         <p:blipFill>
-          <a:blip r:embed="rId4"/>
+          <a:blip r:embed="rId4" cstate="print"/>
           <a:stretch>
             <a:fillRect/>
           </a:stretch>
@@ -4581,7 +4608,7 @@
           <p:nvPr/>
         </p:nvPicPr>
         <p:blipFill>
-          <a:blip r:embed="rId2"/>
+          <a:blip r:embed="rId2" cstate="print"/>
           <a:stretch>
             <a:fillRect/>
           </a:stretch>
@@ -4686,16 +4713,21 @@
             </a:r>
             <a:r>
               <a:rPr lang="en-CA" dirty="0" smtClean="0"/>
-              <a:t>interactive</a:t>
-            </a:r>
-          </a:p>
-          <a:p>
+              <a:t>interactive game</a:t>
+            </a:r>
             <a:endParaRPr lang="en-CA" dirty="0" smtClean="0"/>
           </a:p>
           <a:p>
+            <a:endParaRPr lang="en-CA" dirty="0" smtClean="0"/>
+          </a:p>
+          <a:p>
             <a:r>
               <a:rPr lang="en-CA" dirty="0" smtClean="0"/>
-              <a:t>Chapters system teaching different concepts</a:t>
+              <a:t>Chapters/Level </a:t>
+            </a:r>
+            <a:r>
+              <a:rPr lang="en-CA" dirty="0" smtClean="0"/>
+              <a:t>system teaching different concepts</a:t>
             </a:r>
           </a:p>
           <a:p>
@@ -4704,7 +4736,15 @@
           <a:p>
             <a:r>
               <a:rPr lang="en-CA" dirty="0" smtClean="0"/>
-              <a:t>Children create there own code</a:t>
+              <a:t>Children </a:t>
+            </a:r>
+            <a:r>
+              <a:rPr lang="en-CA" dirty="0" smtClean="0"/>
+              <a:t>create and run their </a:t>
+            </a:r>
+            <a:r>
+              <a:rPr lang="en-CA" dirty="0" smtClean="0"/>
+              <a:t>own code</a:t>
             </a:r>
           </a:p>
         </p:txBody>
@@ -4870,7 +4910,7 @@
           <p:nvPr/>
         </p:nvPicPr>
         <p:blipFill>
-          <a:blip r:embed="rId2"/>
+          <a:blip r:embed="rId2" cstate="print"/>
           <a:stretch>
             <a:fillRect/>
           </a:stretch>
@@ -4971,30 +5011,34 @@
           <a:p>
             <a:r>
               <a:rPr lang="en-CA" dirty="0" smtClean="0"/>
-              <a:t>Expandable and maintainable</a:t>
-            </a:r>
+              <a:t>Easily expandable </a:t>
+            </a:r>
+            <a:r>
+              <a:rPr lang="en-CA" dirty="0" smtClean="0"/>
+              <a:t>and maintainable</a:t>
+            </a:r>
+          </a:p>
+          <a:p>
             <a:endParaRPr lang="en-CA" dirty="0" smtClean="0"/>
           </a:p>
           <a:p>
+            <a:r>
+              <a:rPr lang="en-CA" dirty="0" smtClean="0"/>
+              <a:t>User </a:t>
+            </a:r>
+            <a:r>
+              <a:rPr lang="en-CA" dirty="0" smtClean="0"/>
+              <a:t>friendly, simple intuitive design</a:t>
+            </a:r>
             <a:endParaRPr lang="en-CA" dirty="0" smtClean="0"/>
           </a:p>
           <a:p>
+            <a:endParaRPr lang="en-CA" dirty="0" smtClean="0"/>
+          </a:p>
+          <a:p>
             <a:r>
               <a:rPr lang="en-CA" dirty="0" smtClean="0"/>
-              <a:t>User friendly</a:t>
-            </a:r>
-          </a:p>
-          <a:p>
-            <a:endParaRPr lang="en-CA" dirty="0" smtClean="0"/>
-          </a:p>
-          <a:p>
-            <a:r>
-              <a:rPr lang="en-CA" dirty="0" smtClean="0"/>
-              <a:t>Doesn’t require </a:t>
-            </a:r>
-            <a:r>
-              <a:rPr lang="en-CA" dirty="0" smtClean="0"/>
-              <a:t>teachers to show kids what to do</a:t>
+              <a:t>Gives kids a sandbox to work and experiment in</a:t>
             </a:r>
             <a:endParaRPr lang="en-CA" dirty="0" smtClean="0"/>
           </a:p>
@@ -5164,7 +5208,7 @@
           <p:nvPr/>
         </p:nvPicPr>
         <p:blipFill>
-          <a:blip r:embed="rId2"/>
+          <a:blip r:embed="rId2" cstate="print"/>
           <a:stretch>
             <a:fillRect/>
           </a:stretch>
@@ -5267,26 +5311,17 @@
           <a:p>
             <a:r>
               <a:rPr lang="en-CA" dirty="0" smtClean="0"/>
-              <a:t>Recognize major obstacles, </a:t>
-            </a:r>
+              <a:t>Recognize major obstacles, priorities</a:t>
+            </a:r>
+          </a:p>
+          <a:p>
+            <a:endParaRPr lang="en-CA" dirty="0" smtClean="0"/>
+          </a:p>
+          <a:p>
             <a:r>
               <a:rPr lang="en-CA" dirty="0" smtClean="0"/>
-              <a:t>priorities</a:t>
-            </a:r>
-          </a:p>
-          <a:p>
-            <a:endParaRPr lang="en-CA" dirty="0" smtClean="0"/>
-          </a:p>
-          <a:p>
-            <a:r>
-              <a:rPr lang="en-CA" dirty="0" smtClean="0"/>
-              <a:t>Programming language </a:t>
-            </a:r>
-            <a:r>
-              <a:rPr lang="en-CA" dirty="0" smtClean="0"/>
-              <a:t>selection </a:t>
-            </a:r>
-            <a:endParaRPr lang="en-CA" dirty="0" smtClean="0"/>
+              <a:t>Programming language selection </a:t>
+            </a:r>
           </a:p>
           <a:p>
             <a:pPr lvl="1"/>
@@ -5308,11 +5343,7 @@
           <a:p>
             <a:r>
               <a:rPr lang="en-CA" dirty="0" smtClean="0"/>
-              <a:t>Delegation of </a:t>
-            </a:r>
-            <a:r>
-              <a:rPr lang="en-CA" dirty="0" smtClean="0"/>
-              <a:t>tasks</a:t>
+              <a:t>Delegation of tasks</a:t>
             </a:r>
           </a:p>
           <a:p>
@@ -5323,7 +5354,6 @@
               <a:rPr lang="en-CA" dirty="0" smtClean="0"/>
               <a:t>Create our own language</a:t>
             </a:r>
-            <a:endParaRPr lang="en-CA" dirty="0" smtClean="0"/>
           </a:p>
         </p:txBody>
       </p:sp>
@@ -5480,7 +5510,7 @@
           <p:nvPr/>
         </p:nvPicPr>
         <p:blipFill>
-          <a:blip r:embed="rId2"/>
+          <a:blip r:embed="rId2" cstate="print"/>
           <a:stretch>
             <a:fillRect/>
           </a:stretch>
@@ -5590,16 +5620,26 @@
           <a:p>
             <a:r>
               <a:rPr lang="en-CA" dirty="0" smtClean="0"/>
-              <a:t>Use Python to interpret code</a:t>
-            </a:r>
-          </a:p>
-          <a:p>
+              <a:t>Translate custom “Candy” code into Python</a:t>
+            </a:r>
             <a:endParaRPr lang="en-CA" dirty="0" smtClean="0"/>
           </a:p>
           <a:p>
+            <a:endParaRPr lang="en-CA" dirty="0" smtClean="0"/>
+          </a:p>
+          <a:p>
             <a:r>
               <a:rPr lang="en-CA" dirty="0" smtClean="0"/>
-              <a:t>Decide how the program will teach programming</a:t>
+              <a:t>Decide on simple, testable examples</a:t>
+            </a:r>
+          </a:p>
+          <a:p>
+            <a:endParaRPr lang="en-CA" dirty="0" smtClean="0"/>
+          </a:p>
+          <a:p>
+            <a:r>
+              <a:rPr lang="en-CA" dirty="0" smtClean="0"/>
+              <a:t>Keep things simple, Strings only</a:t>
             </a:r>
             <a:endParaRPr lang="en-CA" dirty="0" smtClean="0"/>
           </a:p>
@@ -5766,7 +5806,7 @@
           <p:nvPr/>
         </p:nvPicPr>
         <p:blipFill>
-          <a:blip r:embed="rId2"/>
+          <a:blip r:embed="rId2" cstate="print"/>
           <a:stretch>
             <a:fillRect/>
           </a:stretch>
@@ -5876,20 +5916,32 @@
           <a:p>
             <a:r>
               <a:rPr lang="en-CA" dirty="0" smtClean="0"/>
-              <a:t>End-to-End development </a:t>
-            </a:r>
+              <a:t>End-to-End development cycle</a:t>
+            </a:r>
+          </a:p>
+          <a:p>
+            <a:endParaRPr lang="en-CA" dirty="0" smtClean="0"/>
+          </a:p>
+          <a:p>
             <a:r>
               <a:rPr lang="en-CA" dirty="0" smtClean="0"/>
-              <a:t>cycle</a:t>
-            </a:r>
-          </a:p>
-          <a:p>
-            <a:endParaRPr lang="en-CA" dirty="0" smtClean="0"/>
-          </a:p>
-          <a:p>
+              <a:t>Quick, regular </a:t>
+            </a:r>
             <a:r>
               <a:rPr lang="en-CA" dirty="0" smtClean="0"/>
-              <a:t>Quick team meeting to discuss major obstacles</a:t>
+              <a:t>team </a:t>
+            </a:r>
+            <a:r>
+              <a:rPr lang="en-CA" dirty="0" smtClean="0"/>
+              <a:t>meetings </a:t>
+            </a:r>
+            <a:r>
+              <a:rPr lang="en-CA" dirty="0" smtClean="0"/>
+              <a:t>to discuss major </a:t>
+            </a:r>
+            <a:r>
+              <a:rPr lang="en-CA" dirty="0" smtClean="0"/>
+              <a:t>obstacles and progress</a:t>
             </a:r>
             <a:endParaRPr lang="en-CA" dirty="0" smtClean="0"/>
           </a:p>
@@ -6056,7 +6108,7 @@
           <p:nvPr/>
         </p:nvPicPr>
         <p:blipFill>
-          <a:blip r:embed="rId2"/>
+          <a:blip r:embed="rId2" cstate="print"/>
           <a:stretch>
             <a:fillRect/>
           </a:stretch>
@@ -6161,7 +6213,7 @@
             </a:r>
             <a:r>
               <a:rPr lang="en-CA" dirty="0" smtClean="0"/>
-              <a:t>Chapters </a:t>
+              <a:t>more chapters/levels </a:t>
             </a:r>
             <a:r>
               <a:rPr lang="en-CA" dirty="0" smtClean="0"/>
@@ -6174,8 +6226,13 @@
           <a:p>
             <a:r>
               <a:rPr lang="en-CA" dirty="0" smtClean="0"/>
-              <a:t>Improve user interface including animations</a:t>
-            </a:r>
+              <a:t>Improve user interface including </a:t>
+            </a:r>
+            <a:r>
+              <a:rPr lang="en-CA" dirty="0" smtClean="0"/>
+              <a:t>animations, games, and rewards</a:t>
+            </a:r>
+            <a:endParaRPr lang="en-CA" dirty="0" smtClean="0"/>
           </a:p>
           <a:p>
             <a:endParaRPr lang="en-CA" dirty="0" smtClean="0"/>
@@ -6265,7 +6322,7 @@
           <p:nvPr/>
         </p:nvPicPr>
         <p:blipFill>
-          <a:blip r:embed="rId3"/>
+          <a:blip r:embed="rId3" cstate="print"/>
           <a:srcRect/>
           <a:stretch>
             <a:fillRect/>

</xml_diff>